<commit_message>
update project presentation file for Expense Tracker
</commit_message>
<xml_diff>
--- a/Expense_Tracker.pptx
+++ b/Expense_Tracker.pptx
@@ -3838,23 +3838,25 @@
           <a:lstStyle/>
           <a:p>
             <a:r>
+              <a:rPr dirty="0"/>
               <a:t>Frontend: Handles UI, user interactions, and API requests</a:t>
             </a:r>
           </a:p>
           <a:p>
             <a:r>
+              <a:rPr dirty="0"/>
               <a:t>Backend: REST API, authentication, business logic</a:t>
             </a:r>
           </a:p>
           <a:p>
             <a:r>
-              <a:t>Database: MongoDB for storing users, expenses, and income</a:t>
-            </a:r>
-          </a:p>
-          <a:p>
-            <a:r>
-              <a:t>Simple architecture diagram (placeholder)</a:t>
-            </a:r>
+              <a:rPr dirty="0"/>
+              <a:t>Database: MongoDB for storing users, expenses, </a:t>
+            </a:r>
+            <a:r>
+              <a:t>and income</a:t>
+            </a:r>
+            <a:endParaRPr dirty="0"/>
           </a:p>
         </p:txBody>
       </p:sp>

</xml_diff>